<commit_message>
added phase 3 contribution sheet. Configured the view and edit functions, added a delete function. Configured the main page to be the log-in page when logged-out and the list page when logged in. Added some design elements to the UI. Tested encryption and decryption, Google log-in, and made sure each page and link on the page worked. Tested log-out feature.
</commit_message>
<xml_diff>
--- a/Phase 3 Documentation/Team_2_Presentation_3.pptx
+++ b/Phase 3 Documentation/Team_2_Presentation_3.pptx
@@ -113,6 +113,11 @@
       </a:defRPr>
     </a:lvl9pPr>
   </p:defaultTextStyle>
+  <p:extLst>
+    <p:ext uri="{EFAFB233-063F-42B5-8137-9DF3F51BA10A}">
+      <p15:sldGuideLst xmlns:p15="http://schemas.microsoft.com/office/powerpoint/2012/main"/>
+    </p:ext>
+  </p:extLst>
 </p:presentation>
 </file>
 
@@ -263,7 +268,7 @@
           <a:p>
             <a:fld id="{64ADD9F5-E36E-419B-A5CC-2A9078F3523D}" type="datetimeFigureOut">
               <a:rPr lang="en-US" smtClean="0"/>
-              <a:t>4/1/2025</a:t>
+              <a:t>4/12/2025</a:t>
             </a:fld>
             <a:endParaRPr lang="en-US"/>
           </a:p>
@@ -461,7 +466,7 @@
           <a:p>
             <a:fld id="{64ADD9F5-E36E-419B-A5CC-2A9078F3523D}" type="datetimeFigureOut">
               <a:rPr lang="en-US" smtClean="0"/>
-              <a:t>4/1/2025</a:t>
+              <a:t>4/12/2025</a:t>
             </a:fld>
             <a:endParaRPr lang="en-US"/>
           </a:p>
@@ -669,7 +674,7 @@
           <a:p>
             <a:fld id="{64ADD9F5-E36E-419B-A5CC-2A9078F3523D}" type="datetimeFigureOut">
               <a:rPr lang="en-US" smtClean="0"/>
-              <a:t>4/1/2025</a:t>
+              <a:t>4/12/2025</a:t>
             </a:fld>
             <a:endParaRPr lang="en-US"/>
           </a:p>
@@ -867,7 +872,7 @@
           <a:p>
             <a:fld id="{64ADD9F5-E36E-419B-A5CC-2A9078F3523D}" type="datetimeFigureOut">
               <a:rPr lang="en-US" smtClean="0"/>
-              <a:t>4/1/2025</a:t>
+              <a:t>4/12/2025</a:t>
             </a:fld>
             <a:endParaRPr lang="en-US"/>
           </a:p>
@@ -1142,7 +1147,7 @@
           <a:p>
             <a:fld id="{64ADD9F5-E36E-419B-A5CC-2A9078F3523D}" type="datetimeFigureOut">
               <a:rPr lang="en-US" smtClean="0"/>
-              <a:t>4/1/2025</a:t>
+              <a:t>4/12/2025</a:t>
             </a:fld>
             <a:endParaRPr lang="en-US"/>
           </a:p>
@@ -1407,7 +1412,7 @@
           <a:p>
             <a:fld id="{64ADD9F5-E36E-419B-A5CC-2A9078F3523D}" type="datetimeFigureOut">
               <a:rPr lang="en-US" smtClean="0"/>
-              <a:t>4/1/2025</a:t>
+              <a:t>4/12/2025</a:t>
             </a:fld>
             <a:endParaRPr lang="en-US"/>
           </a:p>
@@ -1819,7 +1824,7 @@
           <a:p>
             <a:fld id="{64ADD9F5-E36E-419B-A5CC-2A9078F3523D}" type="datetimeFigureOut">
               <a:rPr lang="en-US" smtClean="0"/>
-              <a:t>4/1/2025</a:t>
+              <a:t>4/12/2025</a:t>
             </a:fld>
             <a:endParaRPr lang="en-US"/>
           </a:p>
@@ -1960,7 +1965,7 @@
           <a:p>
             <a:fld id="{64ADD9F5-E36E-419B-A5CC-2A9078F3523D}" type="datetimeFigureOut">
               <a:rPr lang="en-US" smtClean="0"/>
-              <a:t>4/1/2025</a:t>
+              <a:t>4/12/2025</a:t>
             </a:fld>
             <a:endParaRPr lang="en-US"/>
           </a:p>
@@ -2073,7 +2078,7 @@
           <a:p>
             <a:fld id="{64ADD9F5-E36E-419B-A5CC-2A9078F3523D}" type="datetimeFigureOut">
               <a:rPr lang="en-US" smtClean="0"/>
-              <a:t>4/1/2025</a:t>
+              <a:t>4/12/2025</a:t>
             </a:fld>
             <a:endParaRPr lang="en-US"/>
           </a:p>
@@ -2384,7 +2389,7 @@
           <a:p>
             <a:fld id="{64ADD9F5-E36E-419B-A5CC-2A9078F3523D}" type="datetimeFigureOut">
               <a:rPr lang="en-US" smtClean="0"/>
-              <a:t>4/1/2025</a:t>
+              <a:t>4/12/2025</a:t>
             </a:fld>
             <a:endParaRPr lang="en-US"/>
           </a:p>
@@ -2672,7 +2677,7 @@
           <a:p>
             <a:fld id="{64ADD9F5-E36E-419B-A5CC-2A9078F3523D}" type="datetimeFigureOut">
               <a:rPr lang="en-US" smtClean="0"/>
-              <a:t>4/1/2025</a:t>
+              <a:t>4/12/2025</a:t>
             </a:fld>
             <a:endParaRPr lang="en-US"/>
           </a:p>
@@ -2913,7 +2918,7 @@
           <a:p>
             <a:fld id="{64ADD9F5-E36E-419B-A5CC-2A9078F3523D}" type="datetimeFigureOut">
               <a:rPr lang="en-US" smtClean="0"/>
-              <a:t>4/1/2025</a:t>
+              <a:t>4/12/2025</a:t>
             </a:fld>
             <a:endParaRPr lang="en-US"/>
           </a:p>
@@ -3316,6 +3321,14 @@
 <file path=ppt/slides/slide1.xml><?xml version="1.0" encoding="utf-8"?>
 <p:sld xmlns:a="http://schemas.openxmlformats.org/drawingml/2006/main" xmlns:r="http://schemas.openxmlformats.org/officeDocument/2006/relationships" xmlns:p="http://schemas.openxmlformats.org/presentationml/2006/main">
   <p:cSld>
+    <p:bg>
+      <p:bgPr>
+        <a:solidFill>
+          <a:schemeClr val="bg1"/>
+        </a:solidFill>
+        <a:effectLst/>
+      </p:bgPr>
+    </p:bg>
     <p:spTree>
       <p:nvGrpSpPr>
         <p:cNvPr id="1" name=""/>
@@ -3330,6 +3343,66 @@
           <a:chExt cx="0" cy="0"/>
         </a:xfrm>
       </p:grpSpPr>
+      <p:sp useBgFill="1">
+        <p:nvSpPr>
+          <p:cNvPr id="27" name="Rectangle 26">
+            <a:extLst>
+              <a:ext uri="{FF2B5EF4-FFF2-40B4-BE49-F238E27FC236}">
+                <a16:creationId xmlns:a16="http://schemas.microsoft.com/office/drawing/2014/main" id="{6C9ECD1F-1B32-4E48-9736-A1BC9A3237E0}"/>
+              </a:ext>
+              <a:ext uri="{C183D7F6-B498-43B3-948B-1728B52AA6E4}">
+                <adec:decorative xmlns:adec="http://schemas.microsoft.com/office/drawing/2017/decorative" val="1"/>
+              </a:ext>
+            </a:extLst>
+          </p:cNvPr>
+          <p:cNvSpPr>
+            <a:spLocks noGrp="1" noRot="1" noChangeAspect="1" noMove="1" noResize="1" noEditPoints="1" noAdjustHandles="1" noChangeArrowheads="1" noChangeShapeType="1" noTextEdit="1"/>
+          </p:cNvSpPr>
+          <p:nvPr>
+            <p:extLst>
+              <p:ext uri="{386F3935-93C4-4BCD-93E2-E3B085C9AB24}">
+                <p16:designElem xmlns:p16="http://schemas.microsoft.com/office/powerpoint/2015/main" val="1"/>
+              </p:ext>
+            </p:extLst>
+          </p:nvPr>
+        </p:nvSpPr>
+        <p:spPr>
+          <a:xfrm>
+            <a:off x="0" y="0"/>
+            <a:ext cx="12191999" cy="6857365"/>
+          </a:xfrm>
+          <a:prstGeom prst="rect">
+            <a:avLst/>
+          </a:prstGeom>
+          <a:ln>
+            <a:noFill/>
+          </a:ln>
+        </p:spPr>
+        <p:style>
+          <a:lnRef idx="2">
+            <a:schemeClr val="accent1">
+              <a:shade val="50000"/>
+            </a:schemeClr>
+          </a:lnRef>
+          <a:fillRef idx="1">
+            <a:schemeClr val="accent1"/>
+          </a:fillRef>
+          <a:effectRef idx="0">
+            <a:schemeClr val="accent1"/>
+          </a:effectRef>
+          <a:fontRef idx="minor">
+            <a:schemeClr val="lt1"/>
+          </a:fontRef>
+        </p:style>
+        <p:txBody>
+          <a:bodyPr rtlCol="0" anchor="ctr"/>
+          <a:lstStyle/>
+          <a:p>
+            <a:pPr algn="ctr"/>
+            <a:endParaRPr lang="en-US"/>
+          </a:p>
+        </p:txBody>
+      </p:sp>
       <p:sp>
         <p:nvSpPr>
           <p:cNvPr id="2" name="Title 1">
@@ -3346,67 +3419,412 @@
             <p:ph type="ctrTitle"/>
           </p:nvPr>
         </p:nvSpPr>
-        <p:spPr/>
-        <p:txBody>
-          <a:bodyPr/>
-          <a:lstStyle/>
-          <a:p>
-            <a:r>
-              <a:rPr lang="en-US" dirty="0" err="1"/>
+        <p:spPr>
+          <a:xfrm>
+            <a:off x="454467" y="2023110"/>
+            <a:ext cx="2469624" cy="2846070"/>
+          </a:xfrm>
+        </p:spPr>
+        <p:txBody>
+          <a:bodyPr anchor="ctr">
+            <a:normAutofit/>
+          </a:bodyPr>
+          <a:lstStyle/>
+          <a:p>
+            <a:pPr algn="l"/>
+            <a:r>
+              <a:rPr lang="en-US" sz="3100"/>
               <a:t>EncryptNotes</a:t>
             </a:r>
+          </a:p>
+        </p:txBody>
+      </p:sp>
+      <p:sp>
+        <p:nvSpPr>
+          <p:cNvPr id="3" name="Subtitle 2">
+            <a:extLst>
+              <a:ext uri="{FF2B5EF4-FFF2-40B4-BE49-F238E27FC236}">
+                <a16:creationId xmlns:a16="http://schemas.microsoft.com/office/drawing/2014/main" id="{193BFA7D-67D5-2123-9EEE-9B2C19DBFEC0}"/>
+              </a:ext>
+            </a:extLst>
+          </p:cNvPr>
+          <p:cNvSpPr>
+            <a:spLocks noGrp="1"/>
+          </p:cNvSpPr>
+          <p:nvPr>
+            <p:ph type="subTitle" idx="1"/>
+          </p:nvPr>
+        </p:nvSpPr>
+        <p:spPr>
+          <a:xfrm>
+            <a:off x="477627" y="5086350"/>
+            <a:ext cx="2446465" cy="1178298"/>
+          </a:xfrm>
+        </p:spPr>
+        <p:txBody>
+          <a:bodyPr>
+            <a:normAutofit/>
+          </a:bodyPr>
+          <a:lstStyle/>
+          <a:p>
+            <a:pPr algn="l"/>
+            <a:r>
+              <a:rPr lang="en-US" sz="1500"/>
+              <a:t>Phase 3</a:t>
+            </a:r>
+          </a:p>
+          <a:p>
+            <a:pPr algn="l"/>
+            <a:r>
+              <a:rPr lang="en-US" sz="1500"/>
+              <a:t>Team 2</a:t>
+            </a:r>
+          </a:p>
+          <a:p>
+            <a:pPr algn="l"/>
+            <a:r>
+              <a:rPr lang="en-US" sz="1500"/>
+              <a:t>Duncan, Kurejake, Jacob, Grant, Kaden</a:t>
+            </a:r>
+          </a:p>
+        </p:txBody>
+      </p:sp>
+      <p:sp>
+        <p:nvSpPr>
+          <p:cNvPr id="29" name="Rectangle 28">
+            <a:extLst>
+              <a:ext uri="{FF2B5EF4-FFF2-40B4-BE49-F238E27FC236}">
+                <a16:creationId xmlns:a16="http://schemas.microsoft.com/office/drawing/2014/main" id="{90F533E9-6690-41A8-A372-4C6C622D028D}"/>
+              </a:ext>
+              <a:ext uri="{C183D7F6-B498-43B3-948B-1728B52AA6E4}">
+                <adec:decorative xmlns:adec="http://schemas.microsoft.com/office/drawing/2017/decorative" val="1"/>
+              </a:ext>
+            </a:extLst>
+          </p:cNvPr>
+          <p:cNvSpPr>
+            <a:spLocks noGrp="1" noRot="1" noChangeAspect="1" noMove="1" noResize="1" noEditPoints="1" noAdjustHandles="1" noChangeArrowheads="1" noChangeShapeType="1" noTextEdit="1"/>
+          </p:cNvSpPr>
+          <p:nvPr>
+            <p:extLst>
+              <p:ext uri="{386F3935-93C4-4BCD-93E2-E3B085C9AB24}">
+                <p16:designElem xmlns:p16="http://schemas.microsoft.com/office/powerpoint/2015/main" val="1"/>
+              </p:ext>
+            </p:extLst>
+          </p:nvPr>
+        </p:nvSpPr>
+        <p:spPr>
+          <a:xfrm rot="5400000">
+            <a:off x="2522480" y="3392097"/>
+            <a:ext cx="1719072" cy="152382"/>
+          </a:xfrm>
+          <a:prstGeom prst="rect">
+            <a:avLst/>
+          </a:prstGeom>
+          <a:solidFill>
+            <a:schemeClr val="accent4"/>
+          </a:solidFill>
+          <a:ln>
+            <a:noFill/>
+          </a:ln>
+        </p:spPr>
+        <p:style>
+          <a:lnRef idx="2">
+            <a:schemeClr val="accent1">
+              <a:shade val="50000"/>
+            </a:schemeClr>
+          </a:lnRef>
+          <a:fillRef idx="1">
+            <a:schemeClr val="accent1"/>
+          </a:fillRef>
+          <a:effectRef idx="0">
+            <a:schemeClr val="accent1"/>
+          </a:effectRef>
+          <a:fontRef idx="minor">
+            <a:schemeClr val="lt1"/>
+          </a:fontRef>
+        </p:style>
+        <p:txBody>
+          <a:bodyPr rtlCol="0" anchor="ctr"/>
+          <a:lstStyle/>
+          <a:p>
+            <a:pPr algn="ctr"/>
+            <a:endParaRPr lang="en-US"/>
+          </a:p>
+        </p:txBody>
+      </p:sp>
+      <p:sp>
+        <p:nvSpPr>
+          <p:cNvPr id="31" name="Rectangle 30">
+            <a:extLst>
+              <a:ext uri="{FF2B5EF4-FFF2-40B4-BE49-F238E27FC236}">
+                <a16:creationId xmlns:a16="http://schemas.microsoft.com/office/drawing/2014/main" id="{99413ED5-9ED4-4772-BCE4-2BCAE6B12E35}"/>
+              </a:ext>
+              <a:ext uri="{C183D7F6-B498-43B3-948B-1728B52AA6E4}">
+                <adec:decorative xmlns:adec="http://schemas.microsoft.com/office/drawing/2017/decorative" val="1"/>
+              </a:ext>
+            </a:extLst>
+          </p:cNvPr>
+          <p:cNvSpPr>
+            <a:spLocks noGrp="1" noRot="1" noChangeAspect="1" noMove="1" noResize="1" noEditPoints="1" noAdjustHandles="1" noChangeArrowheads="1" noChangeShapeType="1" noTextEdit="1"/>
+          </p:cNvSpPr>
+          <p:nvPr>
+            <p:extLst>
+              <p:ext uri="{386F3935-93C4-4BCD-93E2-E3B085C9AB24}">
+                <p16:designElem xmlns:p16="http://schemas.microsoft.com/office/powerpoint/2015/main" val="1"/>
+              </p:ext>
+            </p:extLst>
+          </p:nvPr>
+        </p:nvSpPr>
+        <p:spPr>
+          <a:xfrm rot="16200000">
+            <a:off x="7042549" y="-827233"/>
+            <a:ext cx="1715478" cy="8583421"/>
+          </a:xfrm>
+          <a:prstGeom prst="rect">
+            <a:avLst/>
+          </a:prstGeom>
+          <a:solidFill>
+            <a:schemeClr val="accent4"/>
+          </a:solidFill>
+          <a:ln>
+            <a:noFill/>
+          </a:ln>
+        </p:spPr>
+        <p:style>
+          <a:lnRef idx="2">
+            <a:schemeClr val="accent1">
+              <a:shade val="50000"/>
+            </a:schemeClr>
+          </a:lnRef>
+          <a:fillRef idx="1">
+            <a:schemeClr val="accent1"/>
+          </a:fillRef>
+          <a:effectRef idx="0">
+            <a:schemeClr val="accent1"/>
+          </a:effectRef>
+          <a:fontRef idx="minor">
+            <a:schemeClr val="lt1"/>
+          </a:fontRef>
+        </p:style>
+        <p:txBody>
+          <a:bodyPr rtlCol="0" anchor="ctr"/>
+          <a:lstStyle/>
+          <a:p>
+            <a:pPr algn="ctr"/>
             <a:endParaRPr lang="en-US" dirty="0"/>
           </a:p>
         </p:txBody>
       </p:sp>
       <p:sp>
         <p:nvSpPr>
-          <p:cNvPr id="3" name="Subtitle 2">
-            <a:extLst>
-              <a:ext uri="{FF2B5EF4-FFF2-40B4-BE49-F238E27FC236}">
-                <a16:creationId xmlns:a16="http://schemas.microsoft.com/office/drawing/2014/main" id="{193BFA7D-67D5-2123-9EEE-9B2C19DBFEC0}"/>
-              </a:ext>
-            </a:extLst>
-          </p:cNvPr>
-          <p:cNvSpPr>
-            <a:spLocks noGrp="1"/>
-          </p:cNvSpPr>
-          <p:nvPr>
-            <p:ph type="subTitle" idx="1"/>
-          </p:nvPr>
-        </p:nvSpPr>
-        <p:spPr/>
-        <p:txBody>
-          <a:bodyPr/>
-          <a:lstStyle/>
-          <a:p>
-            <a:r>
-              <a:rPr lang="en-US" dirty="0"/>
-              <a:t>Phase 3</a:t>
-            </a:r>
-          </a:p>
-          <a:p>
-            <a:r>
-              <a:rPr lang="en-US" dirty="0"/>
-              <a:t>Team 2</a:t>
-            </a:r>
-          </a:p>
-          <a:p>
-            <a:r>
-              <a:rPr lang="en-US" dirty="0"/>
-              <a:t>Duncan, </a:t>
-            </a:r>
-            <a:r>
-              <a:rPr lang="en-US" dirty="0" err="1"/>
-              <a:t>Kurejake</a:t>
-            </a:r>
-            <a:r>
-              <a:rPr lang="en-US" dirty="0"/>
-              <a:t>, Jacob, Grant, Kaden</a:t>
-            </a:r>
-          </a:p>
-        </p:txBody>
-      </p:sp>
+          <p:cNvPr id="33" name="Rectangle 32">
+            <a:extLst>
+              <a:ext uri="{FF2B5EF4-FFF2-40B4-BE49-F238E27FC236}">
+                <a16:creationId xmlns:a16="http://schemas.microsoft.com/office/drawing/2014/main" id="{04357C93-F0CB-4A1C-8F77-4E9063789819}"/>
+              </a:ext>
+              <a:ext uri="{C183D7F6-B498-43B3-948B-1728B52AA6E4}">
+                <adec:decorative xmlns:adec="http://schemas.microsoft.com/office/drawing/2017/decorative" val="1"/>
+              </a:ext>
+            </a:extLst>
+          </p:cNvPr>
+          <p:cNvSpPr>
+            <a:spLocks noGrp="1" noRot="1" noChangeAspect="1" noMove="1" noResize="1" noEditPoints="1" noAdjustHandles="1" noChangeArrowheads="1" noChangeShapeType="1" noTextEdit="1"/>
+          </p:cNvSpPr>
+          <p:nvPr>
+            <p:extLst>
+              <p:ext uri="{386F3935-93C4-4BCD-93E2-E3B085C9AB24}">
+                <p16:designElem xmlns:p16="http://schemas.microsoft.com/office/powerpoint/2015/main" val="1"/>
+              </p:ext>
+            </p:extLst>
+          </p:nvPr>
+        </p:nvSpPr>
+        <p:spPr>
+          <a:xfrm>
+            <a:off x="3807283" y="664308"/>
+            <a:ext cx="8082632" cy="5600340"/>
+          </a:xfrm>
+          <a:prstGeom prst="rect">
+            <a:avLst/>
+          </a:prstGeom>
+          <a:solidFill>
+            <a:schemeClr val="bg1"/>
+          </a:solidFill>
+          <a:ln>
+            <a:noFill/>
+          </a:ln>
+          <a:effectLst>
+            <a:outerShdw blurRad="139700" dist="127000" dir="5400000" algn="t" rotWithShape="0">
+              <a:prstClr val="black">
+                <a:alpha val="15000"/>
+              </a:prstClr>
+            </a:outerShdw>
+          </a:effectLst>
+        </p:spPr>
+        <p:style>
+          <a:lnRef idx="2">
+            <a:schemeClr val="accent1">
+              <a:shade val="50000"/>
+            </a:schemeClr>
+          </a:lnRef>
+          <a:fillRef idx="1">
+            <a:schemeClr val="accent1"/>
+          </a:fillRef>
+          <a:effectRef idx="0">
+            <a:schemeClr val="accent1"/>
+          </a:effectRef>
+          <a:fontRef idx="minor">
+            <a:schemeClr val="lt1"/>
+          </a:fontRef>
+        </p:style>
+        <p:txBody>
+          <a:bodyPr rtlCol="0" anchor="ctr"/>
+          <a:lstStyle/>
+          <a:p>
+            <a:pPr algn="ctr"/>
+            <a:endParaRPr lang="en-US"/>
+          </a:p>
+        </p:txBody>
+      </p:sp>
+      <p:pic>
+        <p:nvPicPr>
+          <p:cNvPr id="15" name="Picture 14" descr="A computer screen with a white background&#10;&#10;AI-generated content may be incorrect.">
+            <a:extLst>
+              <a:ext uri="{FF2B5EF4-FFF2-40B4-BE49-F238E27FC236}">
+                <a16:creationId xmlns:a16="http://schemas.microsoft.com/office/drawing/2014/main" id="{39A9DFAC-9684-0160-B3F8-C31AD5C068F0}"/>
+              </a:ext>
+            </a:extLst>
+          </p:cNvPr>
+          <p:cNvPicPr>
+            <a:picLocks noChangeAspect="1"/>
+          </p:cNvPicPr>
+          <p:nvPr/>
+        </p:nvPicPr>
+        <p:blipFill>
+          <a:blip r:embed="rId2">
+            <a:extLst>
+              <a:ext uri="{28A0092B-C50C-407E-A947-70E740481C1C}">
+                <a14:useLocalDpi xmlns:a14="http://schemas.microsoft.com/office/drawing/2010/main" val="0"/>
+              </a:ext>
+            </a:extLst>
+          </a:blip>
+          <a:srcRect l="5218" r="12431" b="1"/>
+          <a:stretch/>
+        </p:blipFill>
+        <p:spPr>
+          <a:xfrm>
+            <a:off x="3929561" y="883463"/>
+            <a:ext cx="3721608" cy="2542032"/>
+          </a:xfrm>
+          <a:prstGeom prst="rect">
+            <a:avLst/>
+          </a:prstGeom>
+        </p:spPr>
+      </p:pic>
+      <p:pic>
+        <p:nvPicPr>
+          <p:cNvPr id="13" name="Picture 12" descr="A screenshot of a computer&#10;&#10;AI-generated content may be incorrect.">
+            <a:extLst>
+              <a:ext uri="{FF2B5EF4-FFF2-40B4-BE49-F238E27FC236}">
+                <a16:creationId xmlns:a16="http://schemas.microsoft.com/office/drawing/2014/main" id="{F8BDDFAC-3240-3C2E-B24A-25A888FC3E38}"/>
+              </a:ext>
+            </a:extLst>
+          </p:cNvPr>
+          <p:cNvPicPr>
+            <a:picLocks noChangeAspect="1"/>
+          </p:cNvPicPr>
+          <p:nvPr/>
+        </p:nvPicPr>
+        <p:blipFill>
+          <a:blip r:embed="rId3">
+            <a:extLst>
+              <a:ext uri="{28A0092B-C50C-407E-A947-70E740481C1C}">
+                <a14:useLocalDpi xmlns:a14="http://schemas.microsoft.com/office/drawing/2010/main" val="0"/>
+              </a:ext>
+            </a:extLst>
+          </a:blip>
+          <a:srcRect l="17702" r="1" b="1"/>
+          <a:stretch/>
+        </p:blipFill>
+        <p:spPr>
+          <a:xfrm>
+            <a:off x="7910946" y="883463"/>
+            <a:ext cx="3719192" cy="2542032"/>
+          </a:xfrm>
+          <a:prstGeom prst="rect">
+            <a:avLst/>
+          </a:prstGeom>
+        </p:spPr>
+      </p:pic>
+      <p:pic>
+        <p:nvPicPr>
+          <p:cNvPr id="17" name="Picture 16" descr="A screenshot of a computer&#10;&#10;AI-generated content may be incorrect.">
+            <a:extLst>
+              <a:ext uri="{FF2B5EF4-FFF2-40B4-BE49-F238E27FC236}">
+                <a16:creationId xmlns:a16="http://schemas.microsoft.com/office/drawing/2014/main" id="{03BEA4DC-797C-16CF-1E37-C62C743D0943}"/>
+              </a:ext>
+            </a:extLst>
+          </p:cNvPr>
+          <p:cNvPicPr>
+            <a:picLocks noChangeAspect="1"/>
+          </p:cNvPicPr>
+          <p:nvPr/>
+        </p:nvPicPr>
+        <p:blipFill>
+          <a:blip r:embed="rId4">
+            <a:extLst>
+              <a:ext uri="{28A0092B-C50C-407E-A947-70E740481C1C}">
+                <a14:useLocalDpi xmlns:a14="http://schemas.microsoft.com/office/drawing/2010/main" val="0"/>
+              </a:ext>
+            </a:extLst>
+          </a:blip>
+          <a:srcRect l="771" r="16878" b="1"/>
+          <a:stretch/>
+        </p:blipFill>
+        <p:spPr>
+          <a:xfrm>
+            <a:off x="4054251" y="3548348"/>
+            <a:ext cx="3721608" cy="2542032"/>
+          </a:xfrm>
+          <a:prstGeom prst="rect">
+            <a:avLst/>
+          </a:prstGeom>
+        </p:spPr>
+      </p:pic>
+      <p:pic>
+        <p:nvPicPr>
+          <p:cNvPr id="9" name="Picture 8" descr="A computer screen with a white background&#10;&#10;AI-generated content may be incorrect.">
+            <a:extLst>
+              <a:ext uri="{FF2B5EF4-FFF2-40B4-BE49-F238E27FC236}">
+                <a16:creationId xmlns:a16="http://schemas.microsoft.com/office/drawing/2014/main" id="{08C5936B-0CA9-B39A-F8E1-503739689D54}"/>
+              </a:ext>
+            </a:extLst>
+          </p:cNvPr>
+          <p:cNvPicPr>
+            <a:picLocks noChangeAspect="1"/>
+          </p:cNvPicPr>
+          <p:nvPr/>
+        </p:nvPicPr>
+        <p:blipFill>
+          <a:blip r:embed="rId5">
+            <a:extLst>
+              <a:ext uri="{28A0092B-C50C-407E-A947-70E740481C1C}">
+                <a14:useLocalDpi xmlns:a14="http://schemas.microsoft.com/office/drawing/2010/main" val="0"/>
+              </a:ext>
+            </a:extLst>
+          </a:blip>
+          <a:srcRect l="12241" r="5824" b="-3"/>
+          <a:stretch/>
+        </p:blipFill>
+        <p:spPr>
+          <a:xfrm>
+            <a:off x="7916372" y="3548347"/>
+            <a:ext cx="3719192" cy="2542032"/>
+          </a:xfrm>
+          <a:prstGeom prst="rect">
+            <a:avLst/>
+          </a:prstGeom>
+        </p:spPr>
+      </p:pic>
     </p:spTree>
     <p:extLst>
       <p:ext uri="{BB962C8B-B14F-4D97-AF65-F5344CB8AC3E}">
@@ -3417,6 +3835,273 @@
   <p:clrMapOvr>
     <a:masterClrMapping/>
   </p:clrMapOvr>
+  <p:timing>
+    <p:tnLst>
+      <p:par>
+        <p:cTn id="1" dur="indefinite" restart="never" nodeType="tmRoot">
+          <p:childTnLst>
+            <p:seq concurrent="1" nextAc="seek">
+              <p:cTn id="2" dur="indefinite" nodeType="mainSeq">
+                <p:childTnLst>
+                  <p:par>
+                    <p:cTn id="3" fill="hold">
+                      <p:stCondLst>
+                        <p:cond delay="indefinite"/>
+                        <p:cond evt="onBegin" delay="0">
+                          <p:tn val="2"/>
+                        </p:cond>
+                      </p:stCondLst>
+                      <p:childTnLst>
+                        <p:par>
+                          <p:cTn id="4" fill="hold">
+                            <p:stCondLst>
+                              <p:cond delay="0"/>
+                            </p:stCondLst>
+                            <p:childTnLst>
+                              <p:par>
+                                <p:cTn id="5" presetID="10" presetClass="entr" presetSubtype="0" fill="hold" grpId="0" nodeType="withEffect">
+                                  <p:stCondLst>
+                                    <p:cond delay="1000"/>
+                                  </p:stCondLst>
+                                  <p:iterate type="lt">
+                                    <p:tmPct val="10000"/>
+                                  </p:iterate>
+                                  <p:childTnLst>
+                                    <p:set>
+                                      <p:cBhvr>
+                                        <p:cTn id="6" dur="1" fill="hold">
+                                          <p:stCondLst>
+                                            <p:cond delay="0"/>
+                                          </p:stCondLst>
+                                        </p:cTn>
+                                        <p:tgtEl>
+                                          <p:spTgt spid="2"/>
+                                        </p:tgtEl>
+                                        <p:attrNameLst>
+                                          <p:attrName>style.visibility</p:attrName>
+                                        </p:attrNameLst>
+                                      </p:cBhvr>
+                                      <p:to>
+                                        <p:strVal val="visible"/>
+                                      </p:to>
+                                    </p:set>
+                                    <p:animEffect transition="in" filter="fade">
+                                      <p:cBhvr>
+                                        <p:cTn id="7" dur="400"/>
+                                        <p:tgtEl>
+                                          <p:spTgt spid="2"/>
+                                        </p:tgtEl>
+                                      </p:cBhvr>
+                                    </p:animEffect>
+                                  </p:childTnLst>
+                                </p:cTn>
+                              </p:par>
+                              <p:par>
+                                <p:cTn id="8" presetID="10" presetClass="entr" presetSubtype="0" fill="hold" grpId="0" nodeType="withEffect">
+                                  <p:stCondLst>
+                                    <p:cond delay="2000"/>
+                                  </p:stCondLst>
+                                  <p:iterate type="lt">
+                                    <p:tmPct val="10000"/>
+                                  </p:iterate>
+                                  <p:childTnLst>
+                                    <p:set>
+                                      <p:cBhvr>
+                                        <p:cTn id="9" dur="1" fill="hold">
+                                          <p:stCondLst>
+                                            <p:cond delay="0"/>
+                                          </p:stCondLst>
+                                        </p:cTn>
+                                        <p:tgtEl>
+                                          <p:spTgt spid="3">
+                                            <p:txEl>
+                                              <p:pRg st="0" end="0"/>
+                                            </p:txEl>
+                                          </p:spTgt>
+                                        </p:tgtEl>
+                                        <p:attrNameLst>
+                                          <p:attrName>style.visibility</p:attrName>
+                                        </p:attrNameLst>
+                                      </p:cBhvr>
+                                      <p:to>
+                                        <p:strVal val="visible"/>
+                                      </p:to>
+                                    </p:set>
+                                    <p:animEffect transition="in" filter="fade">
+                                      <p:cBhvr>
+                                        <p:cTn id="10" dur="400"/>
+                                        <p:tgtEl>
+                                          <p:spTgt spid="3">
+                                            <p:txEl>
+                                              <p:pRg st="0" end="0"/>
+                                            </p:txEl>
+                                          </p:spTgt>
+                                        </p:tgtEl>
+                                      </p:cBhvr>
+                                    </p:animEffect>
+                                  </p:childTnLst>
+                                </p:cTn>
+                              </p:par>
+                            </p:childTnLst>
+                          </p:cTn>
+                        </p:par>
+                      </p:childTnLst>
+                    </p:cTn>
+                  </p:par>
+                  <p:par>
+                    <p:cTn id="11" fill="hold">
+                      <p:stCondLst>
+                        <p:cond delay="indefinite"/>
+                      </p:stCondLst>
+                      <p:childTnLst>
+                        <p:par>
+                          <p:cTn id="12" fill="hold">
+                            <p:stCondLst>
+                              <p:cond delay="0"/>
+                            </p:stCondLst>
+                            <p:childTnLst>
+                              <p:par>
+                                <p:cTn id="13" presetID="10" presetClass="entr" presetSubtype="0" fill="hold" grpId="0" nodeType="clickEffect">
+                                  <p:stCondLst>
+                                    <p:cond delay="2000"/>
+                                  </p:stCondLst>
+                                  <p:iterate type="lt">
+                                    <p:tmPct val="10000"/>
+                                  </p:iterate>
+                                  <p:childTnLst>
+                                    <p:set>
+                                      <p:cBhvr>
+                                        <p:cTn id="14" dur="1" fill="hold">
+                                          <p:stCondLst>
+                                            <p:cond delay="0"/>
+                                          </p:stCondLst>
+                                        </p:cTn>
+                                        <p:tgtEl>
+                                          <p:spTgt spid="3">
+                                            <p:txEl>
+                                              <p:pRg st="1" end="1"/>
+                                            </p:txEl>
+                                          </p:spTgt>
+                                        </p:tgtEl>
+                                        <p:attrNameLst>
+                                          <p:attrName>style.visibility</p:attrName>
+                                        </p:attrNameLst>
+                                      </p:cBhvr>
+                                      <p:to>
+                                        <p:strVal val="visible"/>
+                                      </p:to>
+                                    </p:set>
+                                    <p:animEffect transition="in" filter="fade">
+                                      <p:cBhvr>
+                                        <p:cTn id="15" dur="400"/>
+                                        <p:tgtEl>
+                                          <p:spTgt spid="3">
+                                            <p:txEl>
+                                              <p:pRg st="1" end="1"/>
+                                            </p:txEl>
+                                          </p:spTgt>
+                                        </p:tgtEl>
+                                      </p:cBhvr>
+                                    </p:animEffect>
+                                  </p:childTnLst>
+                                </p:cTn>
+                              </p:par>
+                            </p:childTnLst>
+                          </p:cTn>
+                        </p:par>
+                      </p:childTnLst>
+                    </p:cTn>
+                  </p:par>
+                  <p:par>
+                    <p:cTn id="16" fill="hold">
+                      <p:stCondLst>
+                        <p:cond delay="indefinite"/>
+                      </p:stCondLst>
+                      <p:childTnLst>
+                        <p:par>
+                          <p:cTn id="17" fill="hold">
+                            <p:stCondLst>
+                              <p:cond delay="0"/>
+                            </p:stCondLst>
+                            <p:childTnLst>
+                              <p:par>
+                                <p:cTn id="18" presetID="10" presetClass="entr" presetSubtype="0" fill="hold" grpId="0" nodeType="clickEffect">
+                                  <p:stCondLst>
+                                    <p:cond delay="2000"/>
+                                  </p:stCondLst>
+                                  <p:iterate type="lt">
+                                    <p:tmPct val="10000"/>
+                                  </p:iterate>
+                                  <p:childTnLst>
+                                    <p:set>
+                                      <p:cBhvr>
+                                        <p:cTn id="19" dur="1" fill="hold">
+                                          <p:stCondLst>
+                                            <p:cond delay="0"/>
+                                          </p:stCondLst>
+                                        </p:cTn>
+                                        <p:tgtEl>
+                                          <p:spTgt spid="3">
+                                            <p:txEl>
+                                              <p:pRg st="2" end="2"/>
+                                            </p:txEl>
+                                          </p:spTgt>
+                                        </p:tgtEl>
+                                        <p:attrNameLst>
+                                          <p:attrName>style.visibility</p:attrName>
+                                        </p:attrNameLst>
+                                      </p:cBhvr>
+                                      <p:to>
+                                        <p:strVal val="visible"/>
+                                      </p:to>
+                                    </p:set>
+                                    <p:animEffect transition="in" filter="fade">
+                                      <p:cBhvr>
+                                        <p:cTn id="20" dur="400"/>
+                                        <p:tgtEl>
+                                          <p:spTgt spid="3">
+                                            <p:txEl>
+                                              <p:pRg st="2" end="2"/>
+                                            </p:txEl>
+                                          </p:spTgt>
+                                        </p:tgtEl>
+                                      </p:cBhvr>
+                                    </p:animEffect>
+                                  </p:childTnLst>
+                                </p:cTn>
+                              </p:par>
+                            </p:childTnLst>
+                          </p:cTn>
+                        </p:par>
+                      </p:childTnLst>
+                    </p:cTn>
+                  </p:par>
+                </p:childTnLst>
+              </p:cTn>
+              <p:prevCondLst>
+                <p:cond evt="onPrev" delay="0">
+                  <p:tgtEl>
+                    <p:sldTgt/>
+                  </p:tgtEl>
+                </p:cond>
+              </p:prevCondLst>
+              <p:nextCondLst>
+                <p:cond evt="onNext" delay="0">
+                  <p:tgtEl>
+                    <p:sldTgt/>
+                  </p:tgtEl>
+                </p:cond>
+              </p:nextCondLst>
+            </p:seq>
+          </p:childTnLst>
+        </p:cTn>
+      </p:par>
+    </p:tnLst>
+    <p:bldLst>
+      <p:bldP spid="2" grpId="0"/>
+      <p:bldP spid="3" grpId="0" build="p"/>
+    </p:bldLst>
+  </p:timing>
 </p:sld>
 </file>
 
@@ -3567,6 +4252,41 @@
           </a:p>
         </p:txBody>
       </p:sp>
+      <p:pic>
+        <p:nvPicPr>
+          <p:cNvPr id="4" name="Picture 3" descr="A computer screen with a white background&#10;&#10;AI-generated content may be incorrect.">
+            <a:extLst>
+              <a:ext uri="{FF2B5EF4-FFF2-40B4-BE49-F238E27FC236}">
+                <a16:creationId xmlns:a16="http://schemas.microsoft.com/office/drawing/2014/main" id="{7123C20B-FB4B-8F0A-B3C8-7C9CFEFCC20D}"/>
+              </a:ext>
+            </a:extLst>
+          </p:cNvPr>
+          <p:cNvPicPr>
+            <a:picLocks noChangeAspect="1"/>
+          </p:cNvPicPr>
+          <p:nvPr/>
+        </p:nvPicPr>
+        <p:blipFill>
+          <a:blip r:embed="rId2">
+            <a:extLst>
+              <a:ext uri="{28A0092B-C50C-407E-A947-70E740481C1C}">
+                <a14:useLocalDpi xmlns:a14="http://schemas.microsoft.com/office/drawing/2010/main" val="0"/>
+              </a:ext>
+            </a:extLst>
+          </a:blip>
+          <a:srcRect l="5218" r="12431" b="1"/>
+          <a:stretch/>
+        </p:blipFill>
+        <p:spPr>
+          <a:xfrm>
+            <a:off x="3929561" y="883463"/>
+            <a:ext cx="3721608" cy="2542032"/>
+          </a:xfrm>
+          <a:prstGeom prst="rect">
+            <a:avLst/>
+          </a:prstGeom>
+        </p:spPr>
+      </p:pic>
     </p:spTree>
     <p:extLst>
       <p:ext uri="{BB962C8B-B14F-4D97-AF65-F5344CB8AC3E}">
@@ -3647,6 +4367,41 @@
           </a:p>
         </p:txBody>
       </p:sp>
+      <p:pic>
+        <p:nvPicPr>
+          <p:cNvPr id="4" name="Picture 3" descr="A screenshot of a computer&#10;&#10;AI-generated content may be incorrect.">
+            <a:extLst>
+              <a:ext uri="{FF2B5EF4-FFF2-40B4-BE49-F238E27FC236}">
+                <a16:creationId xmlns:a16="http://schemas.microsoft.com/office/drawing/2014/main" id="{CA7D39FD-9997-92C5-8F06-9F04681D597B}"/>
+              </a:ext>
+            </a:extLst>
+          </p:cNvPr>
+          <p:cNvPicPr>
+            <a:picLocks noChangeAspect="1"/>
+          </p:cNvPicPr>
+          <p:nvPr/>
+        </p:nvPicPr>
+        <p:blipFill>
+          <a:blip r:embed="rId2">
+            <a:extLst>
+              <a:ext uri="{28A0092B-C50C-407E-A947-70E740481C1C}">
+                <a14:useLocalDpi xmlns:a14="http://schemas.microsoft.com/office/drawing/2010/main" val="0"/>
+              </a:ext>
+            </a:extLst>
+          </a:blip>
+          <a:srcRect l="17702" r="1" b="1"/>
+          <a:stretch/>
+        </p:blipFill>
+        <p:spPr>
+          <a:xfrm>
+            <a:off x="7910946" y="883463"/>
+            <a:ext cx="3719192" cy="2542032"/>
+          </a:xfrm>
+          <a:prstGeom prst="rect">
+            <a:avLst/>
+          </a:prstGeom>
+        </p:spPr>
+      </p:pic>
     </p:spTree>
     <p:extLst>
       <p:ext uri="{BB962C8B-B14F-4D97-AF65-F5344CB8AC3E}">

</xml_diff>

<commit_message>
Update slides to fit the requirements
Added back the slides that I deleted and added a bit more text to the slides.
</commit_message>
<xml_diff>
--- a/Phase 3 Documentation/Team_2_Presentation_3.pptx
+++ b/Phase 3 Documentation/Team_2_Presentation_3.pptx
@@ -11,7 +11,10 @@
     <p:sldId id="259" r:id="rId5"/>
     <p:sldId id="260" r:id="rId6"/>
     <p:sldId id="261" r:id="rId7"/>
-    <p:sldId id="265" r:id="rId8"/>
+    <p:sldId id="266" r:id="rId8"/>
+    <p:sldId id="267" r:id="rId9"/>
+    <p:sldId id="268" r:id="rId10"/>
+    <p:sldId id="265" r:id="rId11"/>
   </p:sldIdLst>
   <p:sldSz cx="12192000" cy="6858000"/>
   <p:notesSz cx="6858000" cy="9144000"/>
@@ -213,7 +216,7 @@
           <a:effectLst/>
           <a:extLst>
             <a:ext uri="{91240B29-F687-4f45-9708-019B960494DF}">
-              <a14:hiddenLine xmlns="" xmlns:a14="http://schemas.microsoft.com/office/drawing/2010/main" w="9525">
+              <a14:hiddenLine xmlns:a14="http://schemas.microsoft.com/office/drawing/2010/main" xmlns="" w="9525">
                 <a:solidFill>
                   <a:srgbClr val="000000"/>
                 </a:solidFill>
@@ -1735,7 +1738,7 @@
           <a:ln/>
           <a:extLst>
             <a:ext uri="{91240B29-F687-4f45-9708-019B960494DF}">
-              <a14:hiddenLine xmlns="" xmlns:a14="http://schemas.microsoft.com/office/drawing/2010/main" w="9525">
+              <a14:hiddenLine xmlns:a14="http://schemas.microsoft.com/office/drawing/2010/main" xmlns="" w="9525">
                 <a:solidFill>
                   <a:srgbClr val="000000"/>
                 </a:solidFill>
@@ -2010,7 +2013,7 @@
           <a:ln/>
           <a:extLst>
             <a:ext uri="{91240B29-F687-4f45-9708-019B960494DF}">
-              <a14:hiddenLine xmlns="" xmlns:a14="http://schemas.microsoft.com/office/drawing/2010/main" w="9525">
+              <a14:hiddenLine xmlns:a14="http://schemas.microsoft.com/office/drawing/2010/main" xmlns="" w="9525">
                 <a:solidFill>
                   <a:srgbClr val="000000"/>
                 </a:solidFill>
@@ -2293,7 +2296,7 @@
           <a:ln/>
           <a:extLst>
             <a:ext uri="{91240B29-F687-4f45-9708-019B960494DF}">
-              <a14:hiddenLine xmlns="" xmlns:a14="http://schemas.microsoft.com/office/drawing/2010/main" w="9525">
+              <a14:hiddenLine xmlns:a14="http://schemas.microsoft.com/office/drawing/2010/main" xmlns="" w="9525">
                 <a:solidFill>
                   <a:srgbClr val="000000"/>
                 </a:solidFill>
@@ -2919,7 +2922,7 @@
           <a:ln/>
           <a:extLst>
             <a:ext uri="{91240B29-F687-4f45-9708-019B960494DF}">
-              <a14:hiddenLine xmlns="" xmlns:a14="http://schemas.microsoft.com/office/drawing/2010/main" w="9525">
+              <a14:hiddenLine xmlns:a14="http://schemas.microsoft.com/office/drawing/2010/main" xmlns="" w="9525">
                 <a:solidFill>
                   <a:srgbClr val="000000"/>
                 </a:solidFill>
@@ -3258,7 +3261,7 @@
           <a:ln/>
           <a:extLst>
             <a:ext uri="{91240B29-F687-4f45-9708-019B960494DF}">
-              <a14:hiddenLine xmlns="" xmlns:a14="http://schemas.microsoft.com/office/drawing/2010/main" w="9525">
+              <a14:hiddenLine xmlns:a14="http://schemas.microsoft.com/office/drawing/2010/main" xmlns="" w="9525">
                 <a:solidFill>
                   <a:srgbClr val="000000"/>
                 </a:solidFill>
@@ -3735,7 +3738,7 @@
           <a:ln/>
           <a:extLst>
             <a:ext uri="{91240B29-F687-4f45-9708-019B960494DF}">
-              <a14:hiddenLine xmlns="" xmlns:a14="http://schemas.microsoft.com/office/drawing/2010/main" w="9525">
+              <a14:hiddenLine xmlns:a14="http://schemas.microsoft.com/office/drawing/2010/main" xmlns="" w="9525">
                 <a:solidFill>
                   <a:srgbClr val="000000"/>
                 </a:solidFill>
@@ -4164,7 +4167,7 @@
           <a:ln/>
           <a:extLst>
             <a:ext uri="{91240B29-F687-4f45-9708-019B960494DF}">
-              <a14:hiddenLine xmlns="" xmlns:a14="http://schemas.microsoft.com/office/drawing/2010/main" w="9525">
+              <a14:hiddenLine xmlns:a14="http://schemas.microsoft.com/office/drawing/2010/main" xmlns="" w="9525">
                 <a:solidFill>
                   <a:srgbClr val="000000"/>
                 </a:solidFill>
@@ -5910,6 +5913,64 @@
 </p:sld>
 </file>
 
+<file path=ppt/slides/slide10.xml><?xml version="1.0" encoding="utf-8"?>
+<p:sld xmlns:a="http://schemas.openxmlformats.org/drawingml/2006/main" xmlns:r="http://schemas.openxmlformats.org/officeDocument/2006/relationships" xmlns:p="http://schemas.openxmlformats.org/presentationml/2006/main">
+  <p:cSld>
+    <p:spTree>
+      <p:nvGrpSpPr>
+        <p:cNvPr id="1" name=""/>
+        <p:cNvGrpSpPr/>
+        <p:nvPr/>
+      </p:nvGrpSpPr>
+      <p:grpSpPr>
+        <a:xfrm>
+          <a:off x="0" y="0"/>
+          <a:ext cx="0" cy="0"/>
+          <a:chOff x="0" y="0"/>
+          <a:chExt cx="0" cy="0"/>
+        </a:xfrm>
+      </p:grpSpPr>
+      <p:sp>
+        <p:nvSpPr>
+          <p:cNvPr id="2" name="Title 1">
+            <a:extLst>
+              <a:ext uri="{FF2B5EF4-FFF2-40B4-BE49-F238E27FC236}">
+                <a16:creationId xmlns:a16="http://schemas.microsoft.com/office/drawing/2014/main" id="{90F3D1FD-D180-4A52-1355-EE849FD62CA3}"/>
+              </a:ext>
+            </a:extLst>
+          </p:cNvPr>
+          <p:cNvSpPr>
+            <a:spLocks noGrp="1"/>
+          </p:cNvSpPr>
+          <p:nvPr>
+            <p:ph type="title"/>
+          </p:nvPr>
+        </p:nvSpPr>
+        <p:spPr/>
+        <p:txBody>
+          <a:bodyPr/>
+          <a:lstStyle/>
+          <a:p>
+            <a:r>
+              <a:rPr lang="en-US" dirty="0"/>
+              <a:t>Questions?</a:t>
+            </a:r>
+          </a:p>
+        </p:txBody>
+      </p:sp>
+    </p:spTree>
+    <p:extLst>
+      <p:ext uri="{BB962C8B-B14F-4D97-AF65-F5344CB8AC3E}">
+        <p14:creationId xmlns:p14="http://schemas.microsoft.com/office/powerpoint/2010/main" val="882423100"/>
+      </p:ext>
+    </p:extLst>
+  </p:cSld>
+  <p:clrMapOvr>
+    <a:masterClrMapping/>
+  </p:clrMapOvr>
+</p:sld>
+</file>
+
 <file path=ppt/slides/slide2.xml><?xml version="1.0" encoding="utf-8"?>
 <p:sld xmlns:a="http://schemas.openxmlformats.org/drawingml/2006/main" xmlns:r="http://schemas.openxmlformats.org/officeDocument/2006/relationships" xmlns:p="http://schemas.openxmlformats.org/presentationml/2006/main">
   <p:cSld>
@@ -6412,7 +6473,7 @@
           <a:p>
             <a:r>
               <a:rPr lang="en-US" sz="1600" dirty="0"/>
-              <a:t>Firstly One for User information like Username, Password, Email, Etc.</a:t>
+              <a:t>Firstly, One for User information like Username, Password, Email, Etc.</a:t>
             </a:r>
           </a:p>
           <a:p>
@@ -6445,14 +6506,13 @@
               </a:ext>
             </a:extLst>
           </a:blip>
-          <a:stretch>
-            <a:fillRect/>
-          </a:stretch>
+          <a:srcRect t="31230" r="45462"/>
+          <a:stretch/>
         </p:blipFill>
         <p:spPr>
           <a:xfrm>
-            <a:off x="5496448" y="2413000"/>
-            <a:ext cx="6089301" cy="3716338"/>
+            <a:off x="5990970" y="2351669"/>
+            <a:ext cx="4879193" cy="3754861"/>
           </a:xfrm>
           <a:prstGeom prst="roundRect">
             <a:avLst>
@@ -6579,7 +6639,7 @@
         <p:spPr>
           <a:xfrm>
             <a:off x="818712" y="2222288"/>
-            <a:ext cx="10554574" cy="1395120"/>
+            <a:ext cx="10554574" cy="3963908"/>
           </a:xfrm>
         </p:spPr>
         <p:txBody>
@@ -6588,14 +6648,41 @@
           <a:p>
             <a:r>
               <a:rPr lang="en-US" dirty="0"/>
-              <a:t>Meant to show what been done and is available in our web-application</a:t>
+              <a:t>Now onto a Demonstration…</a:t>
             </a:r>
           </a:p>
           <a:p>
             <a:r>
               <a:rPr lang="en-US" dirty="0"/>
-              <a:t>Now onto a Demonstration.</a:t>
-            </a:r>
+              <a:t>That’s if we could easily but not so.</a:t>
+            </a:r>
+          </a:p>
+          <a:p>
+            <a:r>
+              <a:rPr lang="en-US" dirty="0"/>
+              <a:t>So, we’ll describe what “would” happen.</a:t>
+            </a:r>
+          </a:p>
+          <a:p>
+            <a:r>
+              <a:rPr lang="en-US" dirty="0"/>
+              <a:t>We would start by starting up / going to the site and login in or signing up</a:t>
+            </a:r>
+          </a:p>
+          <a:p>
+            <a:r>
+              <a:rPr lang="en-US" dirty="0"/>
+              <a:t>Then from there showing the multiple pages and then final go to the NOTE page</a:t>
+            </a:r>
+          </a:p>
+          <a:p>
+            <a:r>
+              <a:rPr lang="en-US" dirty="0"/>
+              <a:t>Where we show how the note would work, like creating a new note, editing, saving, and deletion.</a:t>
+            </a:r>
+          </a:p>
+          <a:p>
+            <a:endParaRPr lang="en-US" dirty="0"/>
           </a:p>
         </p:txBody>
       </p:sp>
@@ -6634,7 +6721,7 @@
           <p:cNvPr id="2" name="Title 1">
             <a:extLst>
               <a:ext uri="{FF2B5EF4-FFF2-40B4-BE49-F238E27FC236}">
-                <a16:creationId xmlns:a16="http://schemas.microsoft.com/office/drawing/2014/main" id="{90F3D1FD-D180-4A52-1355-EE849FD62CA3}"/>
+                <a16:creationId xmlns:a16="http://schemas.microsoft.com/office/drawing/2014/main" id="{D00D73B8-632E-EE7E-8833-09307061AB89}"/>
               </a:ext>
             </a:extLst>
           </p:cNvPr>
@@ -6650,17 +6737,199 @@
           <a:bodyPr/>
           <a:lstStyle/>
           <a:p>
-            <a:r>
-              <a:rPr lang="en-US" dirty="0"/>
-              <a:t>Questions?</a:t>
-            </a:r>
+            <a:endParaRPr lang="en-US"/>
+          </a:p>
+        </p:txBody>
+      </p:sp>
+      <p:sp>
+        <p:nvSpPr>
+          <p:cNvPr id="3" name="Content Placeholder 2">
+            <a:extLst>
+              <a:ext uri="{FF2B5EF4-FFF2-40B4-BE49-F238E27FC236}">
+                <a16:creationId xmlns:a16="http://schemas.microsoft.com/office/drawing/2014/main" id="{2DC27570-748C-1627-9DF9-5FAB1EA520D4}"/>
+              </a:ext>
+            </a:extLst>
+          </p:cNvPr>
+          <p:cNvSpPr>
+            <a:spLocks noGrp="1"/>
+          </p:cNvSpPr>
+          <p:nvPr>
+            <p:ph idx="1"/>
+          </p:nvPr>
+        </p:nvSpPr>
+        <p:spPr/>
+        <p:txBody>
+          <a:bodyPr/>
+          <a:lstStyle/>
+          <a:p>
+            <a:endParaRPr lang="en-US"/>
           </a:p>
         </p:txBody>
       </p:sp>
     </p:spTree>
     <p:extLst>
       <p:ext uri="{BB962C8B-B14F-4D97-AF65-F5344CB8AC3E}">
-        <p14:creationId xmlns:p14="http://schemas.microsoft.com/office/powerpoint/2010/main" val="882423100"/>
+        <p14:creationId xmlns:p14="http://schemas.microsoft.com/office/powerpoint/2010/main" val="2516479117"/>
+      </p:ext>
+    </p:extLst>
+  </p:cSld>
+  <p:clrMapOvr>
+    <a:masterClrMapping/>
+  </p:clrMapOvr>
+</p:sld>
+</file>
+
+<file path=ppt/slides/slide8.xml><?xml version="1.0" encoding="utf-8"?>
+<p:sld xmlns:a="http://schemas.openxmlformats.org/drawingml/2006/main" xmlns:r="http://schemas.openxmlformats.org/officeDocument/2006/relationships" xmlns:p="http://schemas.openxmlformats.org/presentationml/2006/main">
+  <p:cSld>
+    <p:spTree>
+      <p:nvGrpSpPr>
+        <p:cNvPr id="1" name=""/>
+        <p:cNvGrpSpPr/>
+        <p:nvPr/>
+      </p:nvGrpSpPr>
+      <p:grpSpPr>
+        <a:xfrm>
+          <a:off x="0" y="0"/>
+          <a:ext cx="0" cy="0"/>
+          <a:chOff x="0" y="0"/>
+          <a:chExt cx="0" cy="0"/>
+        </a:xfrm>
+      </p:grpSpPr>
+      <p:sp>
+        <p:nvSpPr>
+          <p:cNvPr id="2" name="Title 1">
+            <a:extLst>
+              <a:ext uri="{FF2B5EF4-FFF2-40B4-BE49-F238E27FC236}">
+                <a16:creationId xmlns:a16="http://schemas.microsoft.com/office/drawing/2014/main" id="{DD555649-75D4-8F58-46A2-2EA56C612C95}"/>
+              </a:ext>
+            </a:extLst>
+          </p:cNvPr>
+          <p:cNvSpPr>
+            <a:spLocks noGrp="1"/>
+          </p:cNvSpPr>
+          <p:nvPr>
+            <p:ph type="title"/>
+          </p:nvPr>
+        </p:nvSpPr>
+        <p:spPr/>
+        <p:txBody>
+          <a:bodyPr/>
+          <a:lstStyle/>
+          <a:p>
+            <a:endParaRPr lang="en-US"/>
+          </a:p>
+        </p:txBody>
+      </p:sp>
+      <p:sp>
+        <p:nvSpPr>
+          <p:cNvPr id="3" name="Content Placeholder 2">
+            <a:extLst>
+              <a:ext uri="{FF2B5EF4-FFF2-40B4-BE49-F238E27FC236}">
+                <a16:creationId xmlns:a16="http://schemas.microsoft.com/office/drawing/2014/main" id="{ED89BD78-F640-2D29-E0ED-893B641DC8E6}"/>
+              </a:ext>
+            </a:extLst>
+          </p:cNvPr>
+          <p:cNvSpPr>
+            <a:spLocks noGrp="1"/>
+          </p:cNvSpPr>
+          <p:nvPr>
+            <p:ph idx="1"/>
+          </p:nvPr>
+        </p:nvSpPr>
+        <p:spPr/>
+        <p:txBody>
+          <a:bodyPr/>
+          <a:lstStyle/>
+          <a:p>
+            <a:endParaRPr lang="en-US"/>
+          </a:p>
+        </p:txBody>
+      </p:sp>
+    </p:spTree>
+    <p:extLst>
+      <p:ext uri="{BB962C8B-B14F-4D97-AF65-F5344CB8AC3E}">
+        <p14:creationId xmlns:p14="http://schemas.microsoft.com/office/powerpoint/2010/main" val="1329917461"/>
+      </p:ext>
+    </p:extLst>
+  </p:cSld>
+  <p:clrMapOvr>
+    <a:masterClrMapping/>
+  </p:clrMapOvr>
+</p:sld>
+</file>
+
+<file path=ppt/slides/slide9.xml><?xml version="1.0" encoding="utf-8"?>
+<p:sld xmlns:a="http://schemas.openxmlformats.org/drawingml/2006/main" xmlns:r="http://schemas.openxmlformats.org/officeDocument/2006/relationships" xmlns:p="http://schemas.openxmlformats.org/presentationml/2006/main">
+  <p:cSld>
+    <p:spTree>
+      <p:nvGrpSpPr>
+        <p:cNvPr id="1" name=""/>
+        <p:cNvGrpSpPr/>
+        <p:nvPr/>
+      </p:nvGrpSpPr>
+      <p:grpSpPr>
+        <a:xfrm>
+          <a:off x="0" y="0"/>
+          <a:ext cx="0" cy="0"/>
+          <a:chOff x="0" y="0"/>
+          <a:chExt cx="0" cy="0"/>
+        </a:xfrm>
+      </p:grpSpPr>
+      <p:sp>
+        <p:nvSpPr>
+          <p:cNvPr id="2" name="Title 1">
+            <a:extLst>
+              <a:ext uri="{FF2B5EF4-FFF2-40B4-BE49-F238E27FC236}">
+                <a16:creationId xmlns:a16="http://schemas.microsoft.com/office/drawing/2014/main" id="{8B0DB1D6-B4E9-1D93-E252-151A910C1F33}"/>
+              </a:ext>
+            </a:extLst>
+          </p:cNvPr>
+          <p:cNvSpPr>
+            <a:spLocks noGrp="1"/>
+          </p:cNvSpPr>
+          <p:nvPr>
+            <p:ph type="title"/>
+          </p:nvPr>
+        </p:nvSpPr>
+        <p:spPr/>
+        <p:txBody>
+          <a:bodyPr/>
+          <a:lstStyle/>
+          <a:p>
+            <a:endParaRPr lang="en-US"/>
+          </a:p>
+        </p:txBody>
+      </p:sp>
+      <p:sp>
+        <p:nvSpPr>
+          <p:cNvPr id="3" name="Content Placeholder 2">
+            <a:extLst>
+              <a:ext uri="{FF2B5EF4-FFF2-40B4-BE49-F238E27FC236}">
+                <a16:creationId xmlns:a16="http://schemas.microsoft.com/office/drawing/2014/main" id="{6EE14A5A-2CC5-303E-6B0F-DC0499C993B4}"/>
+              </a:ext>
+            </a:extLst>
+          </p:cNvPr>
+          <p:cNvSpPr>
+            <a:spLocks noGrp="1"/>
+          </p:cNvSpPr>
+          <p:nvPr>
+            <p:ph idx="1"/>
+          </p:nvPr>
+        </p:nvSpPr>
+        <p:spPr/>
+        <p:txBody>
+          <a:bodyPr/>
+          <a:lstStyle/>
+          <a:p>
+            <a:endParaRPr lang="en-US"/>
+          </a:p>
+        </p:txBody>
+      </p:sp>
+    </p:spTree>
+    <p:extLst>
+      <p:ext uri="{BB962C8B-B14F-4D97-AF65-F5344CB8AC3E}">
+        <p14:creationId xmlns:p14="http://schemas.microsoft.com/office/powerpoint/2010/main" val="2384466991"/>
       </p:ext>
     </p:extLst>
   </p:cSld>

</xml_diff>

<commit_message>
Updated Phase 3 Presentation
</commit_message>
<xml_diff>
--- a/Phase 3 Documentation/Team_2_Presentation_3.pptx
+++ b/Phase 3 Documentation/Team_2_Presentation_3.pptx
@@ -10,10 +10,10 @@
     <p:sldId id="258" r:id="rId4"/>
     <p:sldId id="259" r:id="rId5"/>
     <p:sldId id="260" r:id="rId6"/>
-    <p:sldId id="261" r:id="rId7"/>
-    <p:sldId id="266" r:id="rId8"/>
-    <p:sldId id="267" r:id="rId9"/>
-    <p:sldId id="268" r:id="rId10"/>
+    <p:sldId id="268" r:id="rId7"/>
+    <p:sldId id="261" r:id="rId8"/>
+    <p:sldId id="269" r:id="rId9"/>
+    <p:sldId id="267" r:id="rId10"/>
     <p:sldId id="265" r:id="rId11"/>
   </p:sldIdLst>
   <p:sldSz cx="12192000" cy="6858000"/>
@@ -119,6 +119,14 @@
     </p:ext>
   </p:extLst>
 </p:presentation>
+</file>
+
+<file path=ppt/revisionInfo.xml><?xml version="1.0" encoding="utf-8"?>
+<p1510:revInfo xmlns:a="http://schemas.openxmlformats.org/drawingml/2006/main" xmlns:r="http://schemas.openxmlformats.org/officeDocument/2006/relationships" xmlns:p1510="http://schemas.microsoft.com/office/powerpoint/2015/10/main">
+  <p1510:revLst>
+    <p1510:client id="{3472BE9B-41BA-7134-8D63-286745D76E5B}" v="528" dt="2025-04-14T03:14:22.294"/>
+  </p1510:revLst>
+</p1510:revInfo>
 </file>
 
 <file path=ppt/slideLayouts/slideLayout1.xml><?xml version="1.0" encoding="utf-8"?>
@@ -6032,7 +6040,12 @@
             <p:ph idx="1"/>
           </p:nvPr>
         </p:nvSpPr>
-        <p:spPr/>
+        <p:spPr>
+          <a:xfrm>
+            <a:off x="809067" y="2222287"/>
+            <a:ext cx="4516447" cy="3636511"/>
+          </a:xfrm>
+        </p:spPr>
         <p:txBody>
           <a:bodyPr/>
           <a:lstStyle/>
@@ -6093,8 +6106,8 @@
         </p:blipFill>
         <p:spPr>
           <a:xfrm>
-            <a:off x="8470392" y="0"/>
-            <a:ext cx="3721608" cy="2542032"/>
+            <a:off x="5161962" y="2218481"/>
+            <a:ext cx="6219810" cy="4249297"/>
           </a:xfrm>
           <a:prstGeom prst="rect">
             <a:avLst/>
@@ -6175,12 +6188,26 @@
             <p:ph idx="1"/>
           </p:nvPr>
         </p:nvSpPr>
-        <p:spPr/>
+        <p:spPr>
+          <a:xfrm>
+            <a:off x="809067" y="2164414"/>
+            <a:ext cx="3985941" cy="3694384"/>
+          </a:xfrm>
+        </p:spPr>
         <p:txBody>
           <a:bodyPr/>
           <a:lstStyle/>
           <a:p>
-            <a:endParaRPr lang="en-US"/>
+            <a:r>
+              <a:rPr lang="en-US" dirty="0"/>
+              <a:t>Profile Overview</a:t>
+            </a:r>
+          </a:p>
+          <a:p>
+            <a:r>
+              <a:rPr lang="en-US" dirty="0"/>
+              <a:t>Access to Note Archive and create new notes</a:t>
+            </a:r>
           </a:p>
         </p:txBody>
       </p:sp>
@@ -6211,8 +6238,8 @@
         </p:blipFill>
         <p:spPr>
           <a:xfrm>
-            <a:off x="7910946" y="883463"/>
-            <a:ext cx="3719192" cy="2542032"/>
+            <a:off x="4795428" y="2166324"/>
+            <a:ext cx="6304204" cy="4316816"/>
           </a:xfrm>
           <a:prstGeom prst="rect">
             <a:avLst/>
@@ -6628,7 +6655,7 @@
           <p:cNvPr id="2" name="Title 1">
             <a:extLst>
               <a:ext uri="{FF2B5EF4-FFF2-40B4-BE49-F238E27FC236}">
-                <a16:creationId xmlns:a16="http://schemas.microsoft.com/office/drawing/2014/main" id="{44B73B45-C2E5-3721-2090-BE4EC8909DE3}"/>
+                <a16:creationId xmlns:a16="http://schemas.microsoft.com/office/drawing/2014/main" id="{8B0DB1D6-B4E9-1D93-E252-151A910C1F33}"/>
               </a:ext>
             </a:extLst>
           </p:cNvPr>
@@ -6646,7 +6673,7 @@
           <a:p>
             <a:r>
               <a:rPr lang="en-US" dirty="0"/>
-              <a:t>Demonstration</a:t>
+              <a:t>Encryption Method</a:t>
             </a:r>
           </a:p>
         </p:txBody>
@@ -6656,7 +6683,7 @@
           <p:cNvPr id="3" name="Content Placeholder 2">
             <a:extLst>
               <a:ext uri="{FF2B5EF4-FFF2-40B4-BE49-F238E27FC236}">
-                <a16:creationId xmlns:a16="http://schemas.microsoft.com/office/drawing/2014/main" id="{BBE680A1-C608-4CC7-13C5-11C98D0914BF}"/>
+                <a16:creationId xmlns:a16="http://schemas.microsoft.com/office/drawing/2014/main" id="{6EE14A5A-2CC5-303E-6B0F-DC0499C993B4}"/>
               </a:ext>
             </a:extLst>
           </p:cNvPr>
@@ -6667,60 +6694,39 @@
             <p:ph idx="1"/>
           </p:nvPr>
         </p:nvSpPr>
-        <p:spPr>
-          <a:xfrm>
-            <a:off x="818712" y="2222288"/>
-            <a:ext cx="10554574" cy="3963908"/>
-          </a:xfrm>
-        </p:spPr>
+        <p:spPr/>
         <p:txBody>
           <a:bodyPr/>
           <a:lstStyle/>
           <a:p>
+            <a:pPr>
+              <a:lnSpc>
+                <a:spcPct val="200000"/>
+              </a:lnSpc>
+            </a:pPr>
+            <a:r>
+              <a:rPr lang="en-US"/>
+              <a:t>Encryption of notes start at front end each time a note is saved</a:t>
+            </a:r>
+            <a:endParaRPr lang="en-US" dirty="0"/>
+          </a:p>
+          <a:p>
+            <a:pPr>
+              <a:lnSpc>
+                <a:spcPct val="200000"/>
+              </a:lnSpc>
+            </a:pPr>
             <a:r>
               <a:rPr lang="en-US" dirty="0"/>
-              <a:t>Now onto a Demonstration…</a:t>
-            </a:r>
-          </a:p>
-          <a:p>
-            <a:r>
-              <a:rPr lang="en-US" dirty="0"/>
-              <a:t>That’s if we could easily but not so.</a:t>
-            </a:r>
-          </a:p>
-          <a:p>
-            <a:r>
-              <a:rPr lang="en-US" dirty="0"/>
-              <a:t>So, we’ll describe what “would” happen.</a:t>
-            </a:r>
-          </a:p>
-          <a:p>
-            <a:r>
-              <a:rPr lang="en-US" dirty="0"/>
-              <a:t>We would start by starting up / going to the site and login in or signing up</a:t>
-            </a:r>
-          </a:p>
-          <a:p>
-            <a:r>
-              <a:rPr lang="en-US" dirty="0"/>
-              <a:t>Then from there showing the multiple pages and then final go to the NOTE page</a:t>
-            </a:r>
-          </a:p>
-          <a:p>
-            <a:r>
-              <a:rPr lang="en-US" dirty="0"/>
-              <a:t>Where we show how the note would work, like creating a new note, editing, saving, and deletion.</a:t>
-            </a:r>
-          </a:p>
-          <a:p>
-            <a:endParaRPr lang="en-US" dirty="0"/>
+              <a:t>An encryption key is saved to the database to encrypt outgoing notes being queried by the front-end</a:t>
+            </a:r>
           </a:p>
         </p:txBody>
       </p:sp>
     </p:spTree>
     <p:extLst>
       <p:ext uri="{BB962C8B-B14F-4D97-AF65-F5344CB8AC3E}">
-        <p14:creationId xmlns:p14="http://schemas.microsoft.com/office/powerpoint/2010/main" val="145020236"/>
+        <p14:creationId xmlns:p14="http://schemas.microsoft.com/office/powerpoint/2010/main" val="2384466991"/>
       </p:ext>
     </p:extLst>
   </p:cSld>
@@ -6752,7 +6758,7 @@
           <p:cNvPr id="2" name="Title 1">
             <a:extLst>
               <a:ext uri="{FF2B5EF4-FFF2-40B4-BE49-F238E27FC236}">
-                <a16:creationId xmlns:a16="http://schemas.microsoft.com/office/drawing/2014/main" id="{D00D73B8-632E-EE7E-8833-09307061AB89}"/>
+                <a16:creationId xmlns:a16="http://schemas.microsoft.com/office/drawing/2014/main" id="{44B73B45-C2E5-3721-2090-BE4EC8909DE3}"/>
               </a:ext>
             </a:extLst>
           </p:cNvPr>
@@ -6768,7 +6774,10 @@
           <a:bodyPr/>
           <a:lstStyle/>
           <a:p>
-            <a:endParaRPr lang="en-US"/>
+            <a:r>
+              <a:rPr lang="en-US" dirty="0"/>
+              <a:t>Demonstration</a:t>
+            </a:r>
           </a:p>
         </p:txBody>
       </p:sp>
@@ -6777,7 +6786,7 @@
           <p:cNvPr id="3" name="Content Placeholder 2">
             <a:extLst>
               <a:ext uri="{FF2B5EF4-FFF2-40B4-BE49-F238E27FC236}">
-                <a16:creationId xmlns:a16="http://schemas.microsoft.com/office/drawing/2014/main" id="{2DC27570-748C-1627-9DF9-5FAB1EA520D4}"/>
+                <a16:creationId xmlns:a16="http://schemas.microsoft.com/office/drawing/2014/main" id="{BBE680A1-C608-4CC7-13C5-11C98D0914BF}"/>
               </a:ext>
             </a:extLst>
           </p:cNvPr>
@@ -6788,19 +6797,48 @@
             <p:ph idx="1"/>
           </p:nvPr>
         </p:nvSpPr>
-        <p:spPr/>
+        <p:spPr>
+          <a:xfrm>
+            <a:off x="818712" y="2222288"/>
+            <a:ext cx="10554574" cy="3963908"/>
+          </a:xfrm>
+        </p:spPr>
         <p:txBody>
           <a:bodyPr/>
           <a:lstStyle/>
           <a:p>
-            <a:endParaRPr lang="en-US"/>
+            <a:r>
+              <a:rPr lang="en-US" dirty="0"/>
+              <a:t>Now onto a Demonstration…</a:t>
+            </a:r>
+          </a:p>
+          <a:p>
+            <a:r>
+              <a:rPr lang="en-US" dirty="0"/>
+              <a:t>We would start by starting up / going to the site and login in or signing up</a:t>
+            </a:r>
+          </a:p>
+          <a:p>
+            <a:r>
+              <a:rPr lang="en-US" dirty="0"/>
+              <a:t>Then from there showing the multiple pages and then final go to the NOTE page</a:t>
+            </a:r>
+          </a:p>
+          <a:p>
+            <a:r>
+              <a:rPr lang="en-US" dirty="0"/>
+              <a:t>Where we show how the note would work, like creating a new note, editing, saving, and deletion.</a:t>
+            </a:r>
+          </a:p>
+          <a:p>
+            <a:endParaRPr lang="en-US" dirty="0"/>
           </a:p>
         </p:txBody>
       </p:sp>
     </p:spTree>
     <p:extLst>
       <p:ext uri="{BB962C8B-B14F-4D97-AF65-F5344CB8AC3E}">
-        <p14:creationId xmlns:p14="http://schemas.microsoft.com/office/powerpoint/2010/main" val="2516479117"/>
+        <p14:creationId xmlns:p14="http://schemas.microsoft.com/office/powerpoint/2010/main" val="145020236"/>
       </p:ext>
     </p:extLst>
   </p:cSld>
@@ -6832,7 +6870,7 @@
           <p:cNvPr id="2" name="Title 1">
             <a:extLst>
               <a:ext uri="{FF2B5EF4-FFF2-40B4-BE49-F238E27FC236}">
-                <a16:creationId xmlns:a16="http://schemas.microsoft.com/office/drawing/2014/main" id="{DD555649-75D4-8F58-46A2-2EA56C612C95}"/>
+                <a16:creationId xmlns:a16="http://schemas.microsoft.com/office/drawing/2014/main" id="{D05AB79A-211E-AE06-2A64-CFF2A033B372}"/>
               </a:ext>
             </a:extLst>
           </p:cNvPr>
@@ -6857,7 +6895,7 @@
           <p:cNvPr id="3" name="Content Placeholder 2">
             <a:extLst>
               <a:ext uri="{FF2B5EF4-FFF2-40B4-BE49-F238E27FC236}">
-                <a16:creationId xmlns:a16="http://schemas.microsoft.com/office/drawing/2014/main" id="{ED89BD78-F640-2D29-E0ED-893B641DC8E6}"/>
+                <a16:creationId xmlns:a16="http://schemas.microsoft.com/office/drawing/2014/main" id="{1F0F84B6-9854-5353-6EFA-85BB75DF1B86}"/>
               </a:ext>
             </a:extLst>
           </p:cNvPr>
@@ -6880,7 +6918,7 @@
     </p:spTree>
     <p:extLst>
       <p:ext uri="{BB962C8B-B14F-4D97-AF65-F5344CB8AC3E}">
-        <p14:creationId xmlns:p14="http://schemas.microsoft.com/office/powerpoint/2010/main" val="1329917461"/>
+        <p14:creationId xmlns:p14="http://schemas.microsoft.com/office/powerpoint/2010/main" val="633962344"/>
       </p:ext>
     </p:extLst>
   </p:cSld>
@@ -6912,7 +6950,7 @@
           <p:cNvPr id="2" name="Title 1">
             <a:extLst>
               <a:ext uri="{FF2B5EF4-FFF2-40B4-BE49-F238E27FC236}">
-                <a16:creationId xmlns:a16="http://schemas.microsoft.com/office/drawing/2014/main" id="{8B0DB1D6-B4E9-1D93-E252-151A910C1F33}"/>
+                <a16:creationId xmlns:a16="http://schemas.microsoft.com/office/drawing/2014/main" id="{DD555649-75D4-8F58-46A2-2EA56C612C95}"/>
               </a:ext>
             </a:extLst>
           </p:cNvPr>
@@ -6937,7 +6975,7 @@
           <p:cNvPr id="3" name="Content Placeholder 2">
             <a:extLst>
               <a:ext uri="{FF2B5EF4-FFF2-40B4-BE49-F238E27FC236}">
-                <a16:creationId xmlns:a16="http://schemas.microsoft.com/office/drawing/2014/main" id="{6EE14A5A-2CC5-303E-6B0F-DC0499C993B4}"/>
+                <a16:creationId xmlns:a16="http://schemas.microsoft.com/office/drawing/2014/main" id="{ED89BD78-F640-2D29-E0ED-893B641DC8E6}"/>
               </a:ext>
             </a:extLst>
           </p:cNvPr>
@@ -6960,7 +6998,7 @@
     </p:spTree>
     <p:extLst>
       <p:ext uri="{BB962C8B-B14F-4D97-AF65-F5344CB8AC3E}">
-        <p14:creationId xmlns:p14="http://schemas.microsoft.com/office/powerpoint/2010/main" val="2384466991"/>
+        <p14:creationId xmlns:p14="http://schemas.microsoft.com/office/powerpoint/2010/main" val="1329917461"/>
       </p:ext>
     </p:extLst>
   </p:cSld>

</xml_diff>